<commit_message>
added more content to class 2, tweaked script for class 2
</commit_message>
<xml_diff>
--- a/Class_0.pptx
+++ b/Class_0.pptx
@@ -7700,8 +7700,68 @@
             </a:r>
             <a:r>
               <a:rPr lang="en-US" dirty="0" smtClean="0"/>
-              <a:t> link:</a:t>
-            </a:r>
+              <a:t> </a:t>
+            </a:r>
+            <a:r>
+              <a:rPr lang="en-US" dirty="0" smtClean="0"/>
+              <a:t>link: </a:t>
+            </a:r>
+            <a:r>
+              <a:rPr lang="en-US" dirty="0" smtClean="0">
+                <a:hlinkClick r:id="rId3"/>
+              </a:rPr>
+              <a:t>https</a:t>
+            </a:r>
+            <a:r>
+              <a:rPr lang="en-US" dirty="0">
+                <a:hlinkClick r:id="rId3"/>
+              </a:rPr>
+              <a:t>://</a:t>
+            </a:r>
+            <a:r>
+              <a:rPr lang="en-US" dirty="0" smtClean="0">
+                <a:hlinkClick r:id="rId3"/>
+              </a:rPr>
+              <a:t>github.com/Mollinetti/Statistics-R</a:t>
+            </a:r>
+            <a:endParaRPr lang="en-US" dirty="0" smtClean="0"/>
+          </a:p>
+          <a:p>
+            <a:pPr marL="0" indent="0">
+              <a:buNone/>
+            </a:pPr>
+            <a:r>
+              <a:rPr lang="en-US" sz="2000" dirty="0" smtClean="0">
+                <a:solidFill>
+                  <a:srgbClr val="FF0000"/>
+                </a:solidFill>
+              </a:rPr>
+              <a:t>    Don’t know what </a:t>
+            </a:r>
+            <a:r>
+              <a:rPr lang="en-US" sz="2000" dirty="0" err="1" smtClean="0">
+                <a:solidFill>
+                  <a:srgbClr val="FF0000"/>
+                </a:solidFill>
+              </a:rPr>
+              <a:t>github</a:t>
+            </a:r>
+            <a:r>
+              <a:rPr lang="en-US" sz="2000" dirty="0" smtClean="0">
+                <a:solidFill>
+                  <a:srgbClr val="FF0000"/>
+                </a:solidFill>
+              </a:rPr>
+              <a:t> is? Now is a good time to learn</a:t>
+            </a:r>
+            <a:endParaRPr lang="en-US" sz="2000" dirty="0">
+              <a:solidFill>
+                <a:srgbClr val="FF0000"/>
+              </a:solidFill>
+            </a:endParaRPr>
+          </a:p>
+          <a:p>
+            <a:endParaRPr lang="en-US" dirty="0" smtClean="0"/>
           </a:p>
           <a:p>
             <a:endParaRPr lang="en-US" dirty="0"/>
@@ -8946,7 +9006,6 @@
               <a:rPr lang="en-US" dirty="0" smtClean="0"/>
               <a:t>to use datasets more related to biology</a:t>
             </a:r>
-            <a:endParaRPr lang="en-US" dirty="0" smtClean="0"/>
           </a:p>
           <a:p>
             <a:r>

</xml_diff>